<commit_message>
UPDATE 2025 version with fruits and vegetables
</commit_message>
<xml_diff>
--- a/vignettes/img/S04ggplot2/ggplot.pptx
+++ b/vignettes/img/S04ggplot2/ggplot.pptx
@@ -200,7 +200,7 @@
           <a:p>
             <a:fld id="{A8DA81FE-35B7-CC4D-A347-8A2D3240E5A7}" type="datetimeFigureOut">
               <a:rPr lang="fr-FR" smtClean="0"/>
-              <a:t>14/03/2023</a:t>
+              <a:t>11/03/2025</a:t>
             </a:fld>
             <a:endParaRPr lang="fr-FR"/>
           </a:p>
@@ -3495,7 +3495,7 @@
               <a:t>data = </a:t>
             </a:r>
             <a:r>
-              <a:rPr lang="en-US" sz="1890" b="1" dirty="0">
+              <a:rPr lang="en-US" sz="1890" b="1" dirty="0" err="1">
                 <a:solidFill>
                   <a:schemeClr val="bg2">
                     <a:lumMod val="50000"/>
@@ -3504,7 +3504,7 @@
                 <a:latin typeface="Courier New" charset="0"/>
                 <a:cs typeface="Courier New" charset="0"/>
               </a:rPr>
-              <a:t>fruits</a:t>
+              <a:t>fruveg</a:t>
             </a:r>
             <a:r>
               <a:rPr lang="en-US" sz="1890" b="1" dirty="0">
@@ -4901,7 +4901,7 @@
               <a:t>data = </a:t>
             </a:r>
             <a:r>
-              <a:rPr lang="en-US" sz="1890" b="1" dirty="0">
+              <a:rPr lang="en-US" sz="1890" b="1" dirty="0" err="1">
                 <a:solidFill>
                   <a:schemeClr val="bg2">
                     <a:lumMod val="50000"/>
@@ -4910,7 +4910,7 @@
                 <a:latin typeface="Courier New" charset="0"/>
                 <a:cs typeface="Courier New" charset="0"/>
               </a:rPr>
-              <a:t>fruits</a:t>
+              <a:t>fruveg</a:t>
             </a:r>
             <a:r>
               <a:rPr lang="en-US" sz="1890" b="1" dirty="0">
@@ -4950,7 +4950,7 @@
                 <a:latin typeface="Courier New" charset="0"/>
                 <a:cs typeface="Courier New" charset="0"/>
               </a:rPr>
-              <a:t>Sucres</a:t>
+              <a:t>sugar</a:t>
             </a:r>
             <a:r>
               <a:rPr lang="en-US" sz="1890" b="1" dirty="0">
@@ -4969,14 +4969,14 @@
               <a:t>        y = </a:t>
             </a:r>
             <a:r>
-              <a:rPr lang="en-US" sz="1890" b="1" dirty="0" err="1">
+              <a:rPr lang="en-US" sz="1890" b="1" dirty="0">
                 <a:solidFill>
                   <a:srgbClr val="00B050"/>
                 </a:solidFill>
                 <a:latin typeface="Courier New" charset="0"/>
                 <a:cs typeface="Courier New" charset="0"/>
               </a:rPr>
-              <a:t>Energie</a:t>
+              <a:t>energy</a:t>
             </a:r>
             <a:r>
               <a:rPr lang="en-US" sz="1890" b="1" dirty="0">
@@ -4995,14 +4995,14 @@
               <a:t>        color = </a:t>
             </a:r>
             <a:r>
-              <a:rPr lang="en-US" sz="1890" b="1" dirty="0" err="1">
+              <a:rPr lang="en-US" sz="1890" b="1" dirty="0">
                 <a:solidFill>
                   <a:srgbClr val="00B050"/>
                 </a:solidFill>
                 <a:latin typeface="Courier New" charset="0"/>
                 <a:cs typeface="Courier New" charset="0"/>
               </a:rPr>
-              <a:t>groupe</a:t>
+              <a:t>group</a:t>
             </a:r>
             <a:r>
               <a:rPr lang="en-US" sz="1890" b="1" dirty="0">
@@ -5249,7 +5249,7 @@
               <a:t>data = </a:t>
             </a:r>
             <a:r>
-              <a:rPr lang="en-US" sz="1890" b="1" dirty="0">
+              <a:rPr lang="en-US" sz="1890" b="1" dirty="0" err="1">
                 <a:solidFill>
                   <a:schemeClr val="bg2">
                     <a:lumMod val="50000"/>
@@ -5258,7 +5258,7 @@
                 <a:latin typeface="Courier New" charset="0"/>
                 <a:cs typeface="Courier New" charset="0"/>
               </a:rPr>
-              <a:t>fruits</a:t>
+              <a:t>fruveg</a:t>
             </a:r>
             <a:r>
               <a:rPr lang="en-US" sz="1890" b="1" dirty="0">
@@ -5298,7 +5298,7 @@
                 <a:latin typeface="Courier New" charset="0"/>
                 <a:cs typeface="Courier New" charset="0"/>
               </a:rPr>
-              <a:t>Sucres</a:t>
+              <a:t>sugar</a:t>
             </a:r>
             <a:r>
               <a:rPr lang="en-US" sz="1890" b="1" dirty="0">
@@ -5317,14 +5317,14 @@
               <a:t>        y = </a:t>
             </a:r>
             <a:r>
-              <a:rPr lang="en-US" sz="1890" b="1" dirty="0" err="1">
+              <a:rPr lang="en-US" sz="1890" b="1" dirty="0">
                 <a:solidFill>
                   <a:srgbClr val="00B050"/>
                 </a:solidFill>
                 <a:latin typeface="Courier New" charset="0"/>
                 <a:cs typeface="Courier New" charset="0"/>
               </a:rPr>
-              <a:t>Energie</a:t>
+              <a:t>energy</a:t>
             </a:r>
             <a:r>
               <a:rPr lang="en-US" sz="1890" b="1" dirty="0">
@@ -5343,14 +5343,14 @@
               <a:t>        color = </a:t>
             </a:r>
             <a:r>
-              <a:rPr lang="en-US" sz="1890" b="1" dirty="0" err="1">
+              <a:rPr lang="en-US" sz="1890" b="1" dirty="0">
                 <a:solidFill>
                   <a:srgbClr val="00B050"/>
                 </a:solidFill>
                 <a:latin typeface="Courier New" charset="0"/>
                 <a:cs typeface="Courier New" charset="0"/>
               </a:rPr>
-              <a:t>groupe</a:t>
+              <a:t>group</a:t>
             </a:r>
             <a:r>
               <a:rPr lang="en-US" sz="1890" b="1" dirty="0">

</xml_diff>